<commit_message>
First light of a bit of OO example code
</commit_message>
<xml_diff>
--- a/lectures/KR-2.pptx
+++ b/lectures/KR-2.pptx
@@ -275,7 +275,7 @@
           <a:p>
             <a:fld id="{C13A938A-C9BA-0346-A74F-83EB1631032C}" type="datetimeFigureOut">
               <a:rPr lang="en-US" smtClean="0"/>
-              <a:t>8/10/22</a:t>
+              <a:t>1/17/23</a:t>
             </a:fld>
             <a:endParaRPr lang="en-US"/>
           </a:p>
@@ -473,7 +473,7 @@
           <a:p>
             <a:fld id="{C13A938A-C9BA-0346-A74F-83EB1631032C}" type="datetimeFigureOut">
               <a:rPr lang="en-US" smtClean="0"/>
-              <a:t>8/10/22</a:t>
+              <a:t>1/17/23</a:t>
             </a:fld>
             <a:endParaRPr lang="en-US"/>
           </a:p>
@@ -681,7 +681,7 @@
           <a:p>
             <a:fld id="{C13A938A-C9BA-0346-A74F-83EB1631032C}" type="datetimeFigureOut">
               <a:rPr lang="en-US" smtClean="0"/>
-              <a:t>8/10/22</a:t>
+              <a:t>1/17/23</a:t>
             </a:fld>
             <a:endParaRPr lang="en-US"/>
           </a:p>
@@ -879,7 +879,7 @@
           <a:p>
             <a:fld id="{C13A938A-C9BA-0346-A74F-83EB1631032C}" type="datetimeFigureOut">
               <a:rPr lang="en-US" smtClean="0"/>
-              <a:t>8/10/22</a:t>
+              <a:t>1/17/23</a:t>
             </a:fld>
             <a:endParaRPr lang="en-US"/>
           </a:p>
@@ -1154,7 +1154,7 @@
           <a:p>
             <a:fld id="{C13A938A-C9BA-0346-A74F-83EB1631032C}" type="datetimeFigureOut">
               <a:rPr lang="en-US" smtClean="0"/>
-              <a:t>8/10/22</a:t>
+              <a:t>1/17/23</a:t>
             </a:fld>
             <a:endParaRPr lang="en-US"/>
           </a:p>
@@ -1419,7 +1419,7 @@
           <a:p>
             <a:fld id="{C13A938A-C9BA-0346-A74F-83EB1631032C}" type="datetimeFigureOut">
               <a:rPr lang="en-US" smtClean="0"/>
-              <a:t>8/10/22</a:t>
+              <a:t>1/17/23</a:t>
             </a:fld>
             <a:endParaRPr lang="en-US"/>
           </a:p>
@@ -1831,7 +1831,7 @@
           <a:p>
             <a:fld id="{C13A938A-C9BA-0346-A74F-83EB1631032C}" type="datetimeFigureOut">
               <a:rPr lang="en-US" smtClean="0"/>
-              <a:t>8/10/22</a:t>
+              <a:t>1/17/23</a:t>
             </a:fld>
             <a:endParaRPr lang="en-US"/>
           </a:p>
@@ -1972,7 +1972,7 @@
           <a:p>
             <a:fld id="{C13A938A-C9BA-0346-A74F-83EB1631032C}" type="datetimeFigureOut">
               <a:rPr lang="en-US" smtClean="0"/>
-              <a:t>8/10/22</a:t>
+              <a:t>1/17/23</a:t>
             </a:fld>
             <a:endParaRPr lang="en-US"/>
           </a:p>
@@ -2085,7 +2085,7 @@
           <a:p>
             <a:fld id="{C13A938A-C9BA-0346-A74F-83EB1631032C}" type="datetimeFigureOut">
               <a:rPr lang="en-US" smtClean="0"/>
-              <a:t>8/10/22</a:t>
+              <a:t>1/17/23</a:t>
             </a:fld>
             <a:endParaRPr lang="en-US"/>
           </a:p>
@@ -2396,7 +2396,7 @@
           <a:p>
             <a:fld id="{C13A938A-C9BA-0346-A74F-83EB1631032C}" type="datetimeFigureOut">
               <a:rPr lang="en-US" smtClean="0"/>
-              <a:t>8/10/22</a:t>
+              <a:t>1/17/23</a:t>
             </a:fld>
             <a:endParaRPr lang="en-US"/>
           </a:p>
@@ -2684,7 +2684,7 @@
           <a:p>
             <a:fld id="{C13A938A-C9BA-0346-A74F-83EB1631032C}" type="datetimeFigureOut">
               <a:rPr lang="en-US" smtClean="0"/>
-              <a:t>8/10/22</a:t>
+              <a:t>1/17/23</a:t>
             </a:fld>
             <a:endParaRPr lang="en-US"/>
           </a:p>
@@ -2925,7 +2925,7 @@
           <a:p>
             <a:fld id="{C13A938A-C9BA-0346-A74F-83EB1631032C}" type="datetimeFigureOut">
               <a:rPr lang="en-US" smtClean="0"/>
-              <a:t>8/10/22</a:t>
+              <a:t>1/17/23</a:t>
             </a:fld>
             <a:endParaRPr lang="en-US"/>
           </a:p>
@@ -13532,7 +13532,7 @@
         <p:spPr>
           <a:xfrm>
             <a:off x="1078470" y="1714778"/>
-            <a:ext cx="1154803" cy="369332"/>
+            <a:ext cx="1511761" cy="369332"/>
           </a:xfrm>
           <a:prstGeom prst="rect">
             <a:avLst/>
@@ -13547,7 +13547,7 @@
           <a:p>
             <a:r>
               <a:rPr lang="en-US" dirty="0"/>
-              <a:t>Tens place</a:t>
+              <a:t>Sixteens place</a:t>
             </a:r>
           </a:p>
         </p:txBody>

</xml_diff>

<commit_message>
Add the KR-1 Lecture
</commit_message>
<xml_diff>
--- a/lectures/KR-2.pptx
+++ b/lectures/KR-2.pptx
@@ -259,7 +259,7 @@
           <a:p>
             <a:fld id="{C13A938A-C9BA-0346-A74F-83EB1631032C}" type="datetimeFigureOut">
               <a:rPr lang="en-US" smtClean="0"/>
-              <a:t>1/20/23</a:t>
+              <a:t>1/21/23</a:t>
             </a:fld>
             <a:endParaRPr lang="en-US"/>
           </a:p>
@@ -429,7 +429,7 @@
           <a:p>
             <a:fld id="{C13A938A-C9BA-0346-A74F-83EB1631032C}" type="datetimeFigureOut">
               <a:rPr lang="en-US" smtClean="0"/>
-              <a:t>1/20/23</a:t>
+              <a:t>1/21/23</a:t>
             </a:fld>
             <a:endParaRPr lang="en-US"/>
           </a:p>
@@ -609,7 +609,7 @@
           <a:p>
             <a:fld id="{C13A938A-C9BA-0346-A74F-83EB1631032C}" type="datetimeFigureOut">
               <a:rPr lang="en-US" smtClean="0"/>
-              <a:t>1/20/23</a:t>
+              <a:t>1/21/23</a:t>
             </a:fld>
             <a:endParaRPr lang="en-US"/>
           </a:p>
@@ -779,7 +779,7 @@
           <a:p>
             <a:fld id="{C13A938A-C9BA-0346-A74F-83EB1631032C}" type="datetimeFigureOut">
               <a:rPr lang="en-US" smtClean="0"/>
-              <a:t>1/20/23</a:t>
+              <a:t>1/21/23</a:t>
             </a:fld>
             <a:endParaRPr lang="en-US"/>
           </a:p>
@@ -1025,7 +1025,7 @@
           <a:p>
             <a:fld id="{C13A938A-C9BA-0346-A74F-83EB1631032C}" type="datetimeFigureOut">
               <a:rPr lang="en-US" smtClean="0"/>
-              <a:t>1/20/23</a:t>
+              <a:t>1/21/23</a:t>
             </a:fld>
             <a:endParaRPr lang="en-US"/>
           </a:p>
@@ -1257,7 +1257,7 @@
           <a:p>
             <a:fld id="{C13A938A-C9BA-0346-A74F-83EB1631032C}" type="datetimeFigureOut">
               <a:rPr lang="en-US" smtClean="0"/>
-              <a:t>1/20/23</a:t>
+              <a:t>1/21/23</a:t>
             </a:fld>
             <a:endParaRPr lang="en-US"/>
           </a:p>
@@ -1624,7 +1624,7 @@
           <a:p>
             <a:fld id="{C13A938A-C9BA-0346-A74F-83EB1631032C}" type="datetimeFigureOut">
               <a:rPr lang="en-US" smtClean="0"/>
-              <a:t>1/20/23</a:t>
+              <a:t>1/21/23</a:t>
             </a:fld>
             <a:endParaRPr lang="en-US"/>
           </a:p>
@@ -1742,7 +1742,7 @@
           <a:p>
             <a:fld id="{C13A938A-C9BA-0346-A74F-83EB1631032C}" type="datetimeFigureOut">
               <a:rPr lang="en-US" smtClean="0"/>
-              <a:t>1/20/23</a:t>
+              <a:t>1/21/23</a:t>
             </a:fld>
             <a:endParaRPr lang="en-US"/>
           </a:p>
@@ -1837,7 +1837,7 @@
           <a:p>
             <a:fld id="{C13A938A-C9BA-0346-A74F-83EB1631032C}" type="datetimeFigureOut">
               <a:rPr lang="en-US" smtClean="0"/>
-              <a:t>1/20/23</a:t>
+              <a:t>1/21/23</a:t>
             </a:fld>
             <a:endParaRPr lang="en-US"/>
           </a:p>
@@ -2114,7 +2114,7 @@
           <a:p>
             <a:fld id="{C13A938A-C9BA-0346-A74F-83EB1631032C}" type="datetimeFigureOut">
               <a:rPr lang="en-US" smtClean="0"/>
-              <a:t>1/20/23</a:t>
+              <a:t>1/21/23</a:t>
             </a:fld>
             <a:endParaRPr lang="en-US"/>
           </a:p>
@@ -2371,7 +2371,7 @@
           <a:p>
             <a:fld id="{C13A938A-C9BA-0346-A74F-83EB1631032C}" type="datetimeFigureOut">
               <a:rPr lang="en-US" smtClean="0"/>
-              <a:t>1/20/23</a:t>
+              <a:t>1/21/23</a:t>
             </a:fld>
             <a:endParaRPr lang="en-US"/>
           </a:p>
@@ -2584,7 +2584,7 @@
           <a:p>
             <a:fld id="{C13A938A-C9BA-0346-A74F-83EB1631032C}" type="datetimeFigureOut">
               <a:rPr lang="en-US" smtClean="0"/>
-              <a:t>1/20/23</a:t>
+              <a:t>1/21/23</a:t>
             </a:fld>
             <a:endParaRPr lang="en-US"/>
           </a:p>
@@ -5973,7 +5973,10 @@
             </a:bodyPr>
             <a:lstStyle/>
             <a:p>
-              <a:endParaRPr lang="en-US" sz="1013" dirty="0"/>
+              <a:r>
+                <a:rPr lang="en-US" sz="1013" dirty="0"/>
+                <a:t>-</a:t>
+              </a:r>
             </a:p>
           </p:txBody>
         </p:sp>
@@ -6010,7 +6013,10 @@
             </a:bodyPr>
             <a:lstStyle/>
             <a:p>
-              <a:endParaRPr lang="en-US" sz="1013" dirty="0"/>
+              <a:r>
+                <a:rPr lang="en-US" sz="1013" dirty="0"/>
+                <a:t>-</a:t>
+              </a:r>
             </a:p>
           </p:txBody>
         </p:sp>
@@ -6047,7 +6053,10 @@
             </a:bodyPr>
             <a:lstStyle/>
             <a:p>
-              <a:endParaRPr lang="en-US" sz="1013" dirty="0"/>
+              <a:r>
+                <a:rPr lang="en-US" sz="1013" dirty="0"/>
+                <a:t>-</a:t>
+              </a:r>
             </a:p>
           </p:txBody>
         </p:sp>
@@ -6084,7 +6093,10 @@
             </a:bodyPr>
             <a:lstStyle/>
             <a:p>
-              <a:endParaRPr lang="en-US" sz="1013" dirty="0"/>
+              <a:r>
+                <a:rPr lang="en-US" sz="1013" dirty="0"/>
+                <a:t>-</a:t>
+              </a:r>
             </a:p>
           </p:txBody>
         </p:sp>
@@ -6161,7 +6173,10 @@
             </a:bodyPr>
             <a:lstStyle/>
             <a:p>
-              <a:endParaRPr lang="en-US" sz="1013" dirty="0"/>
+              <a:r>
+                <a:rPr lang="en-US" sz="1013" dirty="0"/>
+                <a:t>-</a:t>
+              </a:r>
             </a:p>
           </p:txBody>
         </p:sp>
@@ -6198,7 +6213,10 @@
             </a:bodyPr>
             <a:lstStyle/>
             <a:p>
-              <a:endParaRPr lang="en-US" sz="1013" dirty="0"/>
+              <a:r>
+                <a:rPr lang="en-US" sz="1013" dirty="0"/>
+                <a:t>-</a:t>
+              </a:r>
             </a:p>
           </p:txBody>
         </p:sp>
@@ -6235,7 +6253,10 @@
             </a:bodyPr>
             <a:lstStyle/>
             <a:p>
-              <a:endParaRPr lang="en-US" sz="1013" dirty="0"/>
+              <a:r>
+                <a:rPr lang="en-US" sz="1013" dirty="0"/>
+                <a:t>-</a:t>
+              </a:r>
             </a:p>
           </p:txBody>
         </p:sp>
@@ -6272,7 +6293,10 @@
             </a:bodyPr>
             <a:lstStyle/>
             <a:p>
-              <a:endParaRPr lang="en-US" sz="1013" dirty="0"/>
+              <a:r>
+                <a:rPr lang="en-US" sz="1013" dirty="0"/>
+                <a:t>-</a:t>
+              </a:r>
             </a:p>
           </p:txBody>
         </p:sp>
@@ -6309,7 +6333,10 @@
             </a:bodyPr>
             <a:lstStyle/>
             <a:p>
-              <a:endParaRPr lang="en-US" sz="1013" dirty="0"/>
+              <a:r>
+                <a:rPr lang="en-US" sz="1013" dirty="0"/>
+                <a:t>-</a:t>
+              </a:r>
             </a:p>
           </p:txBody>
         </p:sp>
@@ -6367,7 +6394,10 @@
             </a:bodyPr>
             <a:lstStyle/>
             <a:p>
-              <a:endParaRPr lang="en-US" sz="1013" dirty="0"/>
+              <a:r>
+                <a:rPr lang="en-US" sz="1013" dirty="0"/>
+                <a:t>-</a:t>
+              </a:r>
             </a:p>
           </p:txBody>
         </p:sp>
@@ -6404,7 +6434,10 @@
             </a:bodyPr>
             <a:lstStyle/>
             <a:p>
-              <a:endParaRPr lang="en-US" sz="1013" dirty="0"/>
+              <a:r>
+                <a:rPr lang="en-US" sz="1013" dirty="0"/>
+                <a:t>-</a:t>
+              </a:r>
             </a:p>
           </p:txBody>
         </p:sp>
@@ -6441,7 +6474,10 @@
             </a:bodyPr>
             <a:lstStyle/>
             <a:p>
-              <a:endParaRPr lang="en-US" sz="1013" dirty="0"/>
+              <a:r>
+                <a:rPr lang="en-US" sz="1013" dirty="0"/>
+                <a:t>-</a:t>
+              </a:r>
             </a:p>
           </p:txBody>
         </p:sp>
@@ -6478,7 +6514,10 @@
             </a:bodyPr>
             <a:lstStyle/>
             <a:p>
-              <a:endParaRPr lang="en-US" sz="1013" dirty="0"/>
+              <a:r>
+                <a:rPr lang="en-US" sz="1013" dirty="0"/>
+                <a:t>-</a:t>
+              </a:r>
             </a:p>
           </p:txBody>
         </p:sp>
@@ -6515,7 +6554,10 @@
             </a:bodyPr>
             <a:lstStyle/>
             <a:p>
-              <a:endParaRPr lang="en-US" sz="1013" dirty="0"/>
+              <a:r>
+                <a:rPr lang="en-US" sz="1013" dirty="0"/>
+                <a:t>-</a:t>
+              </a:r>
             </a:p>
           </p:txBody>
         </p:sp>
@@ -6552,7 +6594,10 @@
             </a:bodyPr>
             <a:lstStyle/>
             <a:p>
-              <a:endParaRPr lang="en-US" sz="1013" dirty="0"/>
+              <a:r>
+                <a:rPr lang="en-US" sz="1013" dirty="0"/>
+                <a:t>-</a:t>
+              </a:r>
             </a:p>
           </p:txBody>
         </p:sp>
@@ -6589,7 +6634,10 @@
             </a:bodyPr>
             <a:lstStyle/>
             <a:p>
-              <a:endParaRPr lang="en-US" sz="1013" dirty="0"/>
+              <a:r>
+                <a:rPr lang="en-US" sz="1013" dirty="0"/>
+                <a:t>-</a:t>
+              </a:r>
             </a:p>
           </p:txBody>
         </p:sp>
@@ -6626,7 +6674,10 @@
             </a:bodyPr>
             <a:lstStyle/>
             <a:p>
-              <a:endParaRPr lang="en-US" sz="1013" dirty="0"/>
+              <a:r>
+                <a:rPr lang="en-US" sz="1013" dirty="0"/>
+                <a:t>-</a:t>
+              </a:r>
             </a:p>
           </p:txBody>
         </p:sp>
@@ -6663,7 +6714,10 @@
             </a:bodyPr>
             <a:lstStyle/>
             <a:p>
-              <a:endParaRPr lang="en-US" sz="1013" dirty="0"/>
+              <a:r>
+                <a:rPr lang="en-US" sz="1013" dirty="0"/>
+                <a:t>-</a:t>
+              </a:r>
             </a:p>
           </p:txBody>
         </p:sp>
@@ -8529,7 +8583,7 @@
             <a:pPr lvl="1"/>
             <a:r>
               <a:rPr lang="en-US" dirty="0"/>
-              <a:t>Back-porting of future library code to support 2.x ad 3.x at the same time</a:t>
+              <a:t>Back-porting of future library code to support 2.x and 3.x at the same time</a:t>
             </a:r>
           </a:p>
           <a:p>
@@ -12883,7 +12937,7 @@
                 <a:latin typeface="Courier New" panose="02070309020205020404" pitchFamily="49" charset="0"/>
                 <a:cs typeface="Courier New" panose="02070309020205020404" pitchFamily="49" charset="0"/>
               </a:rPr>
-              <a:t> = 32 + 6 = 42</a:t>
+              <a:t> = 32 + 10 = 42</a:t>
             </a:r>
             <a:endParaRPr lang="en-US" sz="2700" baseline="30000" dirty="0">
               <a:latin typeface="Courier New" panose="02070309020205020404" pitchFamily="49" charset="0"/>
@@ -12915,7 +12969,7 @@
           <a:p>
             <a:r>
               <a:rPr lang="en-US" dirty="0"/>
-              <a:t>Place Value – Base 16</a:t>
+              <a:t>Base 16</a:t>
             </a:r>
           </a:p>
         </p:txBody>
@@ -12953,7 +13007,7 @@
                 <a:latin typeface="Courier New" panose="02070309020205020404" pitchFamily="49" charset="0"/>
                 <a:cs typeface="Courier New" panose="02070309020205020404" pitchFamily="49" charset="0"/>
               </a:rPr>
-              <a:t>26</a:t>
+              <a:t>2A</a:t>
             </a:r>
           </a:p>
         </p:txBody>
@@ -12972,7 +13026,7 @@
         </p:nvGrpSpPr>
         <p:grpSpPr>
           <a:xfrm>
-            <a:off x="3927946" y="1180172"/>
+            <a:off x="3927946" y="315878"/>
             <a:ext cx="2373920" cy="248209"/>
             <a:chOff x="6564923" y="3335216"/>
             <a:chExt cx="3165226" cy="330945"/>
@@ -13433,7 +13487,7 @@
         </p:nvGrpSpPr>
         <p:grpSpPr>
           <a:xfrm>
-            <a:off x="3929071" y="1457171"/>
+            <a:off x="3929071" y="592877"/>
             <a:ext cx="2373920" cy="248209"/>
             <a:chOff x="6564923" y="3335216"/>
             <a:chExt cx="3165226" cy="330945"/>
@@ -13824,7 +13878,7 @@
         </p:nvSpPr>
         <p:spPr>
           <a:xfrm>
-            <a:off x="6304160" y="1180173"/>
+            <a:off x="6304160" y="315879"/>
             <a:ext cx="237392" cy="248209"/>
           </a:xfrm>
           <a:prstGeom prst="rect">
@@ -13861,7 +13915,7 @@
         </p:nvSpPr>
         <p:spPr>
           <a:xfrm>
-            <a:off x="6541552" y="1180173"/>
+            <a:off x="6541552" y="315879"/>
             <a:ext cx="237392" cy="248209"/>
           </a:xfrm>
           <a:prstGeom prst="rect">
@@ -13898,7 +13952,7 @@
         </p:nvSpPr>
         <p:spPr>
           <a:xfrm>
-            <a:off x="6778942" y="1180173"/>
+            <a:off x="6778942" y="315879"/>
             <a:ext cx="237392" cy="248209"/>
           </a:xfrm>
           <a:prstGeom prst="rect">
@@ -13935,7 +13989,7 @@
         </p:nvSpPr>
         <p:spPr>
           <a:xfrm>
-            <a:off x="7016334" y="1180173"/>
+            <a:off x="7016334" y="315879"/>
             <a:ext cx="237392" cy="248209"/>
           </a:xfrm>
           <a:prstGeom prst="rect">
@@ -13972,7 +14026,7 @@
         </p:nvSpPr>
         <p:spPr>
           <a:xfrm>
-            <a:off x="7253725" y="1180173"/>
+            <a:off x="7253725" y="315879"/>
             <a:ext cx="237392" cy="248209"/>
           </a:xfrm>
           <a:prstGeom prst="rect">
@@ -14009,7 +14063,7 @@
         </p:nvSpPr>
         <p:spPr>
           <a:xfrm>
-            <a:off x="7491122" y="1180173"/>
+            <a:off x="7491122" y="315879"/>
             <a:ext cx="237392" cy="248209"/>
           </a:xfrm>
           <a:prstGeom prst="rect">
@@ -14046,7 +14100,7 @@
         </p:nvSpPr>
         <p:spPr>
           <a:xfrm>
-            <a:off x="6305284" y="1457172"/>
+            <a:off x="6305284" y="592878"/>
             <a:ext cx="237392" cy="248209"/>
           </a:xfrm>
           <a:prstGeom prst="rect">
@@ -14083,7 +14137,7 @@
         </p:nvSpPr>
         <p:spPr>
           <a:xfrm>
-            <a:off x="6542676" y="1457172"/>
+            <a:off x="6542676" y="592878"/>
             <a:ext cx="237392" cy="248209"/>
           </a:xfrm>
           <a:prstGeom prst="rect">
@@ -14120,7 +14174,7 @@
         </p:nvSpPr>
         <p:spPr>
           <a:xfrm>
-            <a:off x="6780067" y="1457172"/>
+            <a:off x="6780067" y="592878"/>
             <a:ext cx="237392" cy="248209"/>
           </a:xfrm>
           <a:prstGeom prst="rect">
@@ -14157,7 +14211,7 @@
         </p:nvSpPr>
         <p:spPr>
           <a:xfrm>
-            <a:off x="7017458" y="1457172"/>
+            <a:off x="7017458" y="592878"/>
             <a:ext cx="237392" cy="248209"/>
           </a:xfrm>
           <a:prstGeom prst="rect">
@@ -14194,7 +14248,7 @@
         </p:nvSpPr>
         <p:spPr>
           <a:xfrm>
-            <a:off x="7254850" y="1457172"/>
+            <a:off x="7254850" y="592878"/>
             <a:ext cx="237392" cy="248209"/>
           </a:xfrm>
           <a:prstGeom prst="rect">
@@ -14231,7 +14285,7 @@
         </p:nvSpPr>
         <p:spPr>
           <a:xfrm>
-            <a:off x="7492246" y="1457172"/>
+            <a:off x="7492246" y="592878"/>
             <a:ext cx="237392" cy="248209"/>
           </a:xfrm>
           <a:prstGeom prst="rect">
@@ -14268,7 +14322,7 @@
         </p:nvSpPr>
         <p:spPr>
           <a:xfrm>
-            <a:off x="3668153" y="1189175"/>
+            <a:off x="3668153" y="324881"/>
             <a:ext cx="296876" cy="623248"/>
           </a:xfrm>
           <a:prstGeom prst="rect">
@@ -14309,8 +14363,8 @@
         </p:nvSpPr>
         <p:spPr>
           <a:xfrm>
-            <a:off x="3677635" y="2359032"/>
-            <a:ext cx="296876" cy="1685077"/>
+            <a:off x="3715213" y="1382004"/>
+            <a:ext cx="312906" cy="2746906"/>
           </a:xfrm>
           <a:prstGeom prst="rect">
             <a:avLst/>
@@ -14358,6 +14412,30 @@
               <a:t>6</a:t>
             </a:r>
           </a:p>
+          <a:p>
+            <a:r>
+              <a:rPr lang="en-US" sz="1725" dirty="0"/>
+              <a:t>7</a:t>
+            </a:r>
+          </a:p>
+          <a:p>
+            <a:r>
+              <a:rPr lang="en-US" sz="1725" dirty="0"/>
+              <a:t>8</a:t>
+            </a:r>
+          </a:p>
+          <a:p>
+            <a:r>
+              <a:rPr lang="en-US" sz="1725" dirty="0"/>
+              <a:t>9</a:t>
+            </a:r>
+          </a:p>
+          <a:p>
+            <a:r>
+              <a:rPr lang="en-US" sz="1725" dirty="0"/>
+              <a:t>A</a:t>
+            </a:r>
+          </a:p>
         </p:txBody>
       </p:sp>
       <p:grpSp>
@@ -14374,7 +14452,7 @@
         </p:nvGrpSpPr>
         <p:grpSpPr>
           <a:xfrm>
-            <a:off x="3947877" y="1840583"/>
+            <a:off x="3947877" y="976289"/>
             <a:ext cx="2373920" cy="248209"/>
             <a:chOff x="6564923" y="3335216"/>
             <a:chExt cx="3165226" cy="330945"/>
@@ -14775,7 +14853,7 @@
         </p:nvSpPr>
         <p:spPr>
           <a:xfrm>
-            <a:off x="6324091" y="1840584"/>
+            <a:off x="6324091" y="976290"/>
             <a:ext cx="237392" cy="248209"/>
           </a:xfrm>
           <a:prstGeom prst="rect">
@@ -14813,7 +14891,7 @@
         </p:nvSpPr>
         <p:spPr>
           <a:xfrm>
-            <a:off x="6561482" y="1840584"/>
+            <a:off x="6561482" y="976290"/>
             <a:ext cx="237392" cy="248209"/>
           </a:xfrm>
           <a:prstGeom prst="rect">
@@ -14851,7 +14929,7 @@
         </p:nvSpPr>
         <p:spPr>
           <a:xfrm>
-            <a:off x="6798873" y="1840584"/>
+            <a:off x="6798873" y="976290"/>
             <a:ext cx="237392" cy="248209"/>
           </a:xfrm>
           <a:prstGeom prst="rect">
@@ -14889,7 +14967,7 @@
         </p:nvSpPr>
         <p:spPr>
           <a:xfrm>
-            <a:off x="7036264" y="1840584"/>
+            <a:off x="7036264" y="976290"/>
             <a:ext cx="237392" cy="248209"/>
           </a:xfrm>
           <a:prstGeom prst="rect">
@@ -14927,7 +15005,7 @@
         </p:nvSpPr>
         <p:spPr>
           <a:xfrm>
-            <a:off x="7273656" y="1840584"/>
+            <a:off x="7273656" y="976290"/>
             <a:ext cx="237392" cy="248209"/>
           </a:xfrm>
           <a:prstGeom prst="rect">
@@ -14965,7 +15043,7 @@
         </p:nvSpPr>
         <p:spPr>
           <a:xfrm>
-            <a:off x="7511053" y="1840584"/>
+            <a:off x="7511053" y="976290"/>
             <a:ext cx="237392" cy="248209"/>
           </a:xfrm>
           <a:prstGeom prst="rect">
@@ -14991,10 +15069,10 @@
       </p:sp>
       <p:sp>
         <p:nvSpPr>
-          <p:cNvPr id="101" name="TextBox 100">
-            <a:extLst>
-              <a:ext uri="{FF2B5EF4-FFF2-40B4-BE49-F238E27FC236}">
-                <a16:creationId xmlns:a16="http://schemas.microsoft.com/office/drawing/2014/main" id="{4622CEB9-1D36-B2A4-A29E-EA527188E79A}"/>
+          <p:cNvPr id="109" name="TextBox 108">
+            <a:extLst>
+              <a:ext uri="{FF2B5EF4-FFF2-40B4-BE49-F238E27FC236}">
+                <a16:creationId xmlns:a16="http://schemas.microsoft.com/office/drawing/2014/main" id="{74099463-2B22-AACB-836A-849AB79BED79}"/>
               </a:ext>
             </a:extLst>
           </p:cNvPr>
@@ -15003,8 +15081,84 @@
         </p:nvSpPr>
         <p:spPr>
           <a:xfrm>
-            <a:off x="3920709" y="2927910"/>
-            <a:ext cx="237392" cy="248209"/>
+            <a:off x="4585079" y="2355699"/>
+            <a:ext cx="1918757" cy="553998"/>
+          </a:xfrm>
+          <a:prstGeom prst="rect">
+            <a:avLst/>
+          </a:prstGeom>
+          <a:noFill/>
+        </p:spPr>
+        <p:txBody>
+          <a:bodyPr wrap="square" rtlCol="0">
+            <a:spAutoFit/>
+          </a:bodyPr>
+          <a:lstStyle/>
+          <a:p>
+            <a:r>
+              <a:rPr lang="en-US" sz="3000" dirty="0">
+                <a:latin typeface="Courier New" panose="02070309020205020404" pitchFamily="49" charset="0"/>
+                <a:cs typeface="Courier New" panose="02070309020205020404" pitchFamily="49" charset="0"/>
+              </a:rPr>
+              <a:t>A (10)</a:t>
+            </a:r>
+          </a:p>
+        </p:txBody>
+      </p:sp>
+      <p:sp>
+        <p:nvSpPr>
+          <p:cNvPr id="111" name="TextBox 110">
+            <a:extLst>
+              <a:ext uri="{FF2B5EF4-FFF2-40B4-BE49-F238E27FC236}">
+                <a16:creationId xmlns:a16="http://schemas.microsoft.com/office/drawing/2014/main" id="{803B8B09-7A94-EF27-ABDE-1933DDD5CD07}"/>
+              </a:ext>
+            </a:extLst>
+          </p:cNvPr>
+          <p:cNvSpPr txBox="1"/>
+          <p:nvPr/>
+        </p:nvSpPr>
+        <p:spPr>
+          <a:xfrm>
+            <a:off x="7837868" y="359506"/>
+            <a:ext cx="840774" cy="553998"/>
+          </a:xfrm>
+          <a:prstGeom prst="rect">
+            <a:avLst/>
+          </a:prstGeom>
+          <a:noFill/>
+        </p:spPr>
+        <p:txBody>
+          <a:bodyPr wrap="square" rtlCol="0">
+            <a:spAutoFit/>
+          </a:bodyPr>
+          <a:lstStyle/>
+          <a:p>
+            <a:r>
+              <a:rPr lang="en-US" sz="3000" dirty="0">
+                <a:latin typeface="Courier New" panose="02070309020205020404" pitchFamily="49" charset="0"/>
+                <a:cs typeface="Courier New" panose="02070309020205020404" pitchFamily="49" charset="0"/>
+              </a:rPr>
+              <a:t>32</a:t>
+            </a:r>
+          </a:p>
+        </p:txBody>
+      </p:sp>
+      <p:sp>
+        <p:nvSpPr>
+          <p:cNvPr id="101" name="TextBox 100">
+            <a:extLst>
+              <a:ext uri="{FF2B5EF4-FFF2-40B4-BE49-F238E27FC236}">
+                <a16:creationId xmlns:a16="http://schemas.microsoft.com/office/drawing/2014/main" id="{4622CEB9-1D36-B2A4-A29E-EA527188E79A}"/>
+              </a:ext>
+            </a:extLst>
+          </p:cNvPr>
+          <p:cNvSpPr txBox="1"/>
+          <p:nvPr/>
+        </p:nvSpPr>
+        <p:spPr>
+          <a:xfrm>
+            <a:off x="3958286" y="1942020"/>
+            <a:ext cx="293080" cy="244239"/>
           </a:xfrm>
           <a:prstGeom prst="rect">
             <a:avLst/>
@@ -15040,8 +15194,8 @@
         </p:nvSpPr>
         <p:spPr>
           <a:xfrm>
-            <a:off x="3920709" y="3204909"/>
-            <a:ext cx="237392" cy="248209"/>
+            <a:off x="3958286" y="2214588"/>
+            <a:ext cx="293080" cy="244239"/>
           </a:xfrm>
           <a:prstGeom prst="rect">
             <a:avLst/>
@@ -15077,8 +15231,8 @@
         </p:nvSpPr>
         <p:spPr>
           <a:xfrm>
-            <a:off x="3922153" y="3484945"/>
-            <a:ext cx="237392" cy="248209"/>
+            <a:off x="3960069" y="2490146"/>
+            <a:ext cx="293080" cy="244239"/>
           </a:xfrm>
           <a:prstGeom prst="rect">
             <a:avLst/>
@@ -15114,8 +15268,8 @@
         </p:nvSpPr>
         <p:spPr>
           <a:xfrm>
-            <a:off x="3922153" y="3761944"/>
-            <a:ext cx="237392" cy="248209"/>
+            <a:off x="3960069" y="2762715"/>
+            <a:ext cx="293080" cy="244239"/>
           </a:xfrm>
           <a:prstGeom prst="rect">
             <a:avLst/>
@@ -15151,8 +15305,8 @@
         </p:nvSpPr>
         <p:spPr>
           <a:xfrm>
-            <a:off x="3922153" y="2373771"/>
-            <a:ext cx="237392" cy="248209"/>
+            <a:off x="3960069" y="1396743"/>
+            <a:ext cx="293080" cy="244239"/>
           </a:xfrm>
           <a:prstGeom prst="rect">
             <a:avLst/>
@@ -15188,8 +15342,8 @@
         </p:nvSpPr>
         <p:spPr>
           <a:xfrm>
-            <a:off x="3922153" y="2650770"/>
-            <a:ext cx="237392" cy="248209"/>
+            <a:off x="3960069" y="1669312"/>
+            <a:ext cx="293080" cy="244239"/>
           </a:xfrm>
           <a:prstGeom prst="rect">
             <a:avLst/>
@@ -15213,10 +15367,10 @@
       </p:sp>
       <p:sp>
         <p:nvSpPr>
-          <p:cNvPr id="109" name="TextBox 108">
-            <a:extLst>
-              <a:ext uri="{FF2B5EF4-FFF2-40B4-BE49-F238E27FC236}">
-                <a16:creationId xmlns:a16="http://schemas.microsoft.com/office/drawing/2014/main" id="{74099463-2B22-AACB-836A-849AB79BED79}"/>
+          <p:cNvPr id="2" name="TextBox 1">
+            <a:extLst>
+              <a:ext uri="{FF2B5EF4-FFF2-40B4-BE49-F238E27FC236}">
+                <a16:creationId xmlns:a16="http://schemas.microsoft.com/office/drawing/2014/main" id="{EEF01795-24AA-BA33-1382-B69D65FA4CD6}"/>
               </a:ext>
             </a:extLst>
           </p:cNvPr>
@@ -15225,13 +15379,18 @@
         </p:nvSpPr>
         <p:spPr>
           <a:xfrm>
-            <a:off x="4622796" y="2987085"/>
-            <a:ext cx="840774" cy="553998"/>
+            <a:off x="3963802" y="3028533"/>
+            <a:ext cx="293080" cy="244239"/>
           </a:xfrm>
           <a:prstGeom prst="rect">
             <a:avLst/>
           </a:prstGeom>
           <a:noFill/>
+          <a:ln>
+            <a:solidFill>
+              <a:schemeClr val="tx1"/>
+            </a:solidFill>
+          </a:ln>
         </p:spPr>
         <p:txBody>
           <a:bodyPr wrap="square" rtlCol="0">
@@ -15239,22 +15398,16 @@
           </a:bodyPr>
           <a:lstStyle/>
           <a:p>
-            <a:r>
-              <a:rPr lang="en-US" sz="3000" dirty="0">
-                <a:latin typeface="Courier New" panose="02070309020205020404" pitchFamily="49" charset="0"/>
-                <a:cs typeface="Courier New" panose="02070309020205020404" pitchFamily="49" charset="0"/>
-              </a:rPr>
-              <a:t>6</a:t>
-            </a:r>
-          </a:p>
-        </p:txBody>
-      </p:sp>
-      <p:sp>
-        <p:nvSpPr>
-          <p:cNvPr id="111" name="TextBox 110">
-            <a:extLst>
-              <a:ext uri="{FF2B5EF4-FFF2-40B4-BE49-F238E27FC236}">
-                <a16:creationId xmlns:a16="http://schemas.microsoft.com/office/drawing/2014/main" id="{803B8B09-7A94-EF27-ABDE-1933DDD5CD07}"/>
+            <a:endParaRPr lang="en-US" sz="1013" dirty="0"/>
+          </a:p>
+        </p:txBody>
+      </p:sp>
+      <p:sp>
+        <p:nvSpPr>
+          <p:cNvPr id="3" name="TextBox 2">
+            <a:extLst>
+              <a:ext uri="{FF2B5EF4-FFF2-40B4-BE49-F238E27FC236}">
+                <a16:creationId xmlns:a16="http://schemas.microsoft.com/office/drawing/2014/main" id="{E6013571-5768-F2C0-55DF-EC7BE3A38878}"/>
               </a:ext>
             </a:extLst>
           </p:cNvPr>
@@ -15263,13 +15416,18 @@
         </p:nvSpPr>
         <p:spPr>
           <a:xfrm>
-            <a:off x="7837868" y="1223800"/>
-            <a:ext cx="840774" cy="553998"/>
+            <a:off x="3963802" y="3301101"/>
+            <a:ext cx="293080" cy="244239"/>
           </a:xfrm>
           <a:prstGeom prst="rect">
             <a:avLst/>
           </a:prstGeom>
           <a:noFill/>
+          <a:ln>
+            <a:solidFill>
+              <a:schemeClr val="tx1"/>
+            </a:solidFill>
+          </a:ln>
         </p:spPr>
         <p:txBody>
           <a:bodyPr wrap="square" rtlCol="0">
@@ -15277,13 +15435,81 @@
           </a:bodyPr>
           <a:lstStyle/>
           <a:p>
-            <a:r>
-              <a:rPr lang="en-US" sz="3000" dirty="0">
-                <a:latin typeface="Courier New" panose="02070309020205020404" pitchFamily="49" charset="0"/>
-                <a:cs typeface="Courier New" panose="02070309020205020404" pitchFamily="49" charset="0"/>
-              </a:rPr>
-              <a:t>32</a:t>
-            </a:r>
+            <a:endParaRPr lang="en-US" sz="1013" dirty="0"/>
+          </a:p>
+        </p:txBody>
+      </p:sp>
+      <p:sp>
+        <p:nvSpPr>
+          <p:cNvPr id="30" name="TextBox 29">
+            <a:extLst>
+              <a:ext uri="{FF2B5EF4-FFF2-40B4-BE49-F238E27FC236}">
+                <a16:creationId xmlns:a16="http://schemas.microsoft.com/office/drawing/2014/main" id="{2366EDB2-BDA9-1520-F4D6-04DBA4AAD8CE}"/>
+              </a:ext>
+            </a:extLst>
+          </p:cNvPr>
+          <p:cNvSpPr txBox="1"/>
+          <p:nvPr/>
+        </p:nvSpPr>
+        <p:spPr>
+          <a:xfrm>
+            <a:off x="3965585" y="3576659"/>
+            <a:ext cx="293080" cy="244239"/>
+          </a:xfrm>
+          <a:prstGeom prst="rect">
+            <a:avLst/>
+          </a:prstGeom>
+          <a:noFill/>
+          <a:ln>
+            <a:solidFill>
+              <a:schemeClr val="tx1"/>
+            </a:solidFill>
+          </a:ln>
+        </p:spPr>
+        <p:txBody>
+          <a:bodyPr wrap="square" rtlCol="0">
+            <a:spAutoFit/>
+          </a:bodyPr>
+          <a:lstStyle/>
+          <a:p>
+            <a:endParaRPr lang="en-US" sz="1013" dirty="0"/>
+          </a:p>
+        </p:txBody>
+      </p:sp>
+      <p:sp>
+        <p:nvSpPr>
+          <p:cNvPr id="31" name="TextBox 30">
+            <a:extLst>
+              <a:ext uri="{FF2B5EF4-FFF2-40B4-BE49-F238E27FC236}">
+                <a16:creationId xmlns:a16="http://schemas.microsoft.com/office/drawing/2014/main" id="{BC988C22-B134-BF38-A5C2-48D43D2AB2AD}"/>
+              </a:ext>
+            </a:extLst>
+          </p:cNvPr>
+          <p:cNvSpPr txBox="1"/>
+          <p:nvPr/>
+        </p:nvSpPr>
+        <p:spPr>
+          <a:xfrm>
+            <a:off x="3965585" y="3849228"/>
+            <a:ext cx="293080" cy="244239"/>
+          </a:xfrm>
+          <a:prstGeom prst="rect">
+            <a:avLst/>
+          </a:prstGeom>
+          <a:noFill/>
+          <a:ln>
+            <a:solidFill>
+              <a:schemeClr val="tx1"/>
+            </a:solidFill>
+          </a:ln>
+        </p:spPr>
+        <p:txBody>
+          <a:bodyPr wrap="square" rtlCol="0">
+            <a:spAutoFit/>
+          </a:bodyPr>
+          <a:lstStyle/>
+          <a:p>
+            <a:endParaRPr lang="en-US" sz="1013" dirty="0"/>
           </a:p>
         </p:txBody>
       </p:sp>

</xml_diff>